<commit_message>
'master: init commit Вс янв 10 00:11:06 MSK 2021'
</commit_message>
<xml_diff>
--- a/My/OLD/Презентация Microsoft PowerPoint.pptx
+++ b/My/OLD/Презентация Microsoft PowerPoint.pptx
@@ -6,6 +6,8 @@
   </p:sldMasterIdLst>
   <p:sldIdLst>
     <p:sldId id="256" r:id="rId2"/>
+    <p:sldId id="257" r:id="rId3"/>
+    <p:sldId id="258" r:id="rId4"/>
   </p:sldIdLst>
   <p:sldSz cx="12192000" cy="6858000"/>
   <p:notesSz cx="6858000" cy="9144000"/>
@@ -3086,6 +3088,1384 @@
 </p:sld>
 </file>
 
+<file path=ppt/slides/slide2.xml><?xml version="1.0" encoding="utf-8"?>
+<p:sld xmlns:a="http://schemas.openxmlformats.org/drawingml/2006/main" xmlns:r="http://schemas.openxmlformats.org/officeDocument/2006/relationships" xmlns:p="http://schemas.openxmlformats.org/presentationml/2006/main">
+  <p:cSld>
+    <p:spTree>
+      <p:nvGrpSpPr>
+        <p:cNvPr id="1" name=""/>
+        <p:cNvGrpSpPr/>
+        <p:nvPr/>
+      </p:nvGrpSpPr>
+      <p:grpSpPr>
+        <a:xfrm>
+          <a:off x="0" y="0"/>
+          <a:ext cx="0" cy="0"/>
+          <a:chOff x="0" y="0"/>
+          <a:chExt cx="0" cy="0"/>
+        </a:xfrm>
+      </p:grpSpPr>
+      <p:pic>
+        <p:nvPicPr>
+          <p:cNvPr id="7" name="Рисунок 6"/>
+          <p:cNvPicPr>
+            <a:picLocks noChangeAspect="1"/>
+          </p:cNvPicPr>
+          <p:nvPr/>
+        </p:nvPicPr>
+        <p:blipFill>
+          <a:blip r:embed="rId2">
+            <a:extLst>
+              <a:ext uri="{28A0092B-C50C-407E-A947-70E740481C1C}">
+                <a14:useLocalDpi xmlns:a14="http://schemas.microsoft.com/office/drawing/2010/main" val="0"/>
+              </a:ext>
+            </a:extLst>
+          </a:blip>
+          <a:stretch>
+            <a:fillRect/>
+          </a:stretch>
+        </p:blipFill>
+        <p:spPr>
+          <a:xfrm>
+            <a:off x="914400" y="862012"/>
+            <a:ext cx="10058400" cy="5262728"/>
+          </a:xfrm>
+          <a:prstGeom prst="rect">
+            <a:avLst/>
+          </a:prstGeom>
+        </p:spPr>
+      </p:pic>
+      <p:sp>
+        <p:nvSpPr>
+          <p:cNvPr id="5" name="Овал 4"/>
+          <p:cNvSpPr/>
+          <p:nvPr/>
+        </p:nvSpPr>
+        <p:spPr>
+          <a:xfrm>
+            <a:off x="1447800" y="1633537"/>
+            <a:ext cx="314325" cy="314325"/>
+          </a:xfrm>
+          <a:prstGeom prst="ellipse">
+            <a:avLst/>
+          </a:prstGeom>
+          <a:solidFill>
+            <a:srgbClr val="FF0000"/>
+          </a:solidFill>
+          <a:ln>
+            <a:noFill/>
+          </a:ln>
+        </p:spPr>
+        <p:style>
+          <a:lnRef idx="2">
+            <a:schemeClr val="accent1">
+              <a:shade val="50000"/>
+            </a:schemeClr>
+          </a:lnRef>
+          <a:fillRef idx="1">
+            <a:schemeClr val="accent1"/>
+          </a:fillRef>
+          <a:effectRef idx="0">
+            <a:schemeClr val="accent1"/>
+          </a:effectRef>
+          <a:fontRef idx="minor">
+            <a:schemeClr val="lt1"/>
+          </a:fontRef>
+        </p:style>
+        <p:txBody>
+          <a:bodyPr rtlCol="0" anchor="ctr"/>
+          <a:lstStyle/>
+          <a:p>
+            <a:pPr algn="ctr"/>
+            <a:r>
+              <a:rPr lang="ru-RU" dirty="0" smtClean="0">
+                <a:solidFill>
+                  <a:schemeClr val="bg1"/>
+                </a:solidFill>
+              </a:rPr>
+              <a:t>1</a:t>
+            </a:r>
+            <a:endParaRPr lang="ru-RU" dirty="0">
+              <a:solidFill>
+                <a:schemeClr val="bg1"/>
+              </a:solidFill>
+            </a:endParaRPr>
+          </a:p>
+        </p:txBody>
+      </p:sp>
+      <p:sp>
+        <p:nvSpPr>
+          <p:cNvPr id="6" name="Скругленная прямоугольная выноска 5"/>
+          <p:cNvSpPr/>
+          <p:nvPr/>
+        </p:nvSpPr>
+        <p:spPr>
+          <a:xfrm>
+            <a:off x="1762125" y="1182814"/>
+            <a:ext cx="809625" cy="450723"/>
+          </a:xfrm>
+          <a:prstGeom prst="wedgeRoundRectCallout">
+            <a:avLst>
+              <a:gd name="adj1" fmla="val -48781"/>
+              <a:gd name="adj2" fmla="val 92402"/>
+              <a:gd name="adj3" fmla="val 16667"/>
+            </a:avLst>
+          </a:prstGeom>
+          <a:solidFill>
+            <a:schemeClr val="bg1"/>
+          </a:solidFill>
+          <a:ln>
+            <a:solidFill>
+              <a:srgbClr val="FF0000"/>
+            </a:solidFill>
+          </a:ln>
+        </p:spPr>
+        <p:style>
+          <a:lnRef idx="2">
+            <a:schemeClr val="accent1">
+              <a:shade val="50000"/>
+            </a:schemeClr>
+          </a:lnRef>
+          <a:fillRef idx="1">
+            <a:schemeClr val="accent1"/>
+          </a:fillRef>
+          <a:effectRef idx="0">
+            <a:schemeClr val="accent1"/>
+          </a:effectRef>
+          <a:fontRef idx="minor">
+            <a:schemeClr val="lt1"/>
+          </a:fontRef>
+        </p:style>
+        <p:txBody>
+          <a:bodyPr rtlCol="0" anchor="ctr"/>
+          <a:lstStyle/>
+          <a:p>
+            <a:pPr algn="ctr"/>
+            <a:r>
+              <a:rPr lang="ru-RU" sz="1200" dirty="0" smtClean="0">
+                <a:solidFill>
+                  <a:srgbClr val="FF0000"/>
+                </a:solidFill>
+              </a:rPr>
+              <a:t>Метод запроса</a:t>
+            </a:r>
+            <a:endParaRPr lang="ru-RU" sz="1200" dirty="0">
+              <a:solidFill>
+                <a:srgbClr val="FF0000"/>
+              </a:solidFill>
+            </a:endParaRPr>
+          </a:p>
+        </p:txBody>
+      </p:sp>
+      <p:sp>
+        <p:nvSpPr>
+          <p:cNvPr id="8" name="Овал 7"/>
+          <p:cNvSpPr/>
+          <p:nvPr/>
+        </p:nvSpPr>
+        <p:spPr>
+          <a:xfrm>
+            <a:off x="3552825" y="1633536"/>
+            <a:ext cx="314325" cy="314325"/>
+          </a:xfrm>
+          <a:prstGeom prst="ellipse">
+            <a:avLst/>
+          </a:prstGeom>
+          <a:solidFill>
+            <a:srgbClr val="FF0000"/>
+          </a:solidFill>
+          <a:ln>
+            <a:noFill/>
+          </a:ln>
+        </p:spPr>
+        <p:style>
+          <a:lnRef idx="2">
+            <a:schemeClr val="accent1">
+              <a:shade val="50000"/>
+            </a:schemeClr>
+          </a:lnRef>
+          <a:fillRef idx="1">
+            <a:schemeClr val="accent1"/>
+          </a:fillRef>
+          <a:effectRef idx="0">
+            <a:schemeClr val="accent1"/>
+          </a:effectRef>
+          <a:fontRef idx="minor">
+            <a:schemeClr val="lt1"/>
+          </a:fontRef>
+        </p:style>
+        <p:txBody>
+          <a:bodyPr rtlCol="0" anchor="ctr"/>
+          <a:lstStyle/>
+          <a:p>
+            <a:pPr algn="ctr"/>
+            <a:r>
+              <a:rPr lang="ru-RU" dirty="0" smtClean="0">
+                <a:solidFill>
+                  <a:schemeClr val="bg1"/>
+                </a:solidFill>
+              </a:rPr>
+              <a:t>2</a:t>
+            </a:r>
+            <a:endParaRPr lang="ru-RU" dirty="0">
+              <a:solidFill>
+                <a:schemeClr val="bg1"/>
+              </a:solidFill>
+            </a:endParaRPr>
+          </a:p>
+        </p:txBody>
+      </p:sp>
+      <p:sp>
+        <p:nvSpPr>
+          <p:cNvPr id="9" name="Скругленная прямоугольная выноска 8"/>
+          <p:cNvSpPr/>
+          <p:nvPr/>
+        </p:nvSpPr>
+        <p:spPr>
+          <a:xfrm>
+            <a:off x="3883818" y="1117660"/>
+            <a:ext cx="1504950" cy="450723"/>
+          </a:xfrm>
+          <a:prstGeom prst="wedgeRoundRectCallout">
+            <a:avLst>
+              <a:gd name="adj1" fmla="val -48781"/>
+              <a:gd name="adj2" fmla="val 92402"/>
+              <a:gd name="adj3" fmla="val 16667"/>
+            </a:avLst>
+          </a:prstGeom>
+          <a:solidFill>
+            <a:schemeClr val="bg1"/>
+          </a:solidFill>
+          <a:ln>
+            <a:solidFill>
+              <a:srgbClr val="FF0000"/>
+            </a:solidFill>
+          </a:ln>
+        </p:spPr>
+        <p:style>
+          <a:lnRef idx="2">
+            <a:schemeClr val="accent1">
+              <a:shade val="50000"/>
+            </a:schemeClr>
+          </a:lnRef>
+          <a:fillRef idx="1">
+            <a:schemeClr val="accent1"/>
+          </a:fillRef>
+          <a:effectRef idx="0">
+            <a:schemeClr val="accent1"/>
+          </a:effectRef>
+          <a:fontRef idx="minor">
+            <a:schemeClr val="lt1"/>
+          </a:fontRef>
+        </p:style>
+        <p:txBody>
+          <a:bodyPr rtlCol="0" anchor="ctr"/>
+          <a:lstStyle/>
+          <a:p>
+            <a:pPr algn="ctr"/>
+            <a:r>
+              <a:rPr lang="ru-RU" sz="1200" dirty="0" smtClean="0">
+                <a:solidFill>
+                  <a:srgbClr val="FF0000"/>
+                </a:solidFill>
+              </a:rPr>
+              <a:t>Полный путь до сервера</a:t>
+            </a:r>
+            <a:endParaRPr lang="ru-RU" sz="1200" dirty="0">
+              <a:solidFill>
+                <a:srgbClr val="FF0000"/>
+              </a:solidFill>
+            </a:endParaRPr>
+          </a:p>
+        </p:txBody>
+      </p:sp>
+      <p:sp>
+        <p:nvSpPr>
+          <p:cNvPr id="10" name="Овал 9"/>
+          <p:cNvSpPr/>
+          <p:nvPr/>
+        </p:nvSpPr>
+        <p:spPr>
+          <a:xfrm>
+            <a:off x="2819400" y="2357436"/>
+            <a:ext cx="314325" cy="314325"/>
+          </a:xfrm>
+          <a:prstGeom prst="ellipse">
+            <a:avLst/>
+          </a:prstGeom>
+          <a:solidFill>
+            <a:srgbClr val="FF0000"/>
+          </a:solidFill>
+          <a:ln>
+            <a:noFill/>
+          </a:ln>
+        </p:spPr>
+        <p:style>
+          <a:lnRef idx="2">
+            <a:schemeClr val="accent1">
+              <a:shade val="50000"/>
+            </a:schemeClr>
+          </a:lnRef>
+          <a:fillRef idx="1">
+            <a:schemeClr val="accent1"/>
+          </a:fillRef>
+          <a:effectRef idx="0">
+            <a:schemeClr val="accent1"/>
+          </a:effectRef>
+          <a:fontRef idx="minor">
+            <a:schemeClr val="lt1"/>
+          </a:fontRef>
+        </p:style>
+        <p:txBody>
+          <a:bodyPr rtlCol="0" anchor="ctr"/>
+          <a:lstStyle/>
+          <a:p>
+            <a:pPr algn="ctr"/>
+            <a:r>
+              <a:rPr lang="ru-RU" dirty="0" smtClean="0">
+                <a:solidFill>
+                  <a:schemeClr val="bg1"/>
+                </a:solidFill>
+              </a:rPr>
+              <a:t>3</a:t>
+            </a:r>
+            <a:endParaRPr lang="ru-RU" dirty="0">
+              <a:solidFill>
+                <a:schemeClr val="bg1"/>
+              </a:solidFill>
+            </a:endParaRPr>
+          </a:p>
+        </p:txBody>
+      </p:sp>
+      <p:sp>
+        <p:nvSpPr>
+          <p:cNvPr id="12" name="Овал 11"/>
+          <p:cNvSpPr/>
+          <p:nvPr/>
+        </p:nvSpPr>
+        <p:spPr>
+          <a:xfrm>
+            <a:off x="5291137" y="3179051"/>
+            <a:ext cx="314325" cy="314325"/>
+          </a:xfrm>
+          <a:prstGeom prst="ellipse">
+            <a:avLst/>
+          </a:prstGeom>
+          <a:solidFill>
+            <a:srgbClr val="FF0000"/>
+          </a:solidFill>
+          <a:ln>
+            <a:noFill/>
+          </a:ln>
+        </p:spPr>
+        <p:style>
+          <a:lnRef idx="2">
+            <a:schemeClr val="accent1">
+              <a:shade val="50000"/>
+            </a:schemeClr>
+          </a:lnRef>
+          <a:fillRef idx="1">
+            <a:schemeClr val="accent1"/>
+          </a:fillRef>
+          <a:effectRef idx="0">
+            <a:schemeClr val="accent1"/>
+          </a:effectRef>
+          <a:fontRef idx="minor">
+            <a:schemeClr val="lt1"/>
+          </a:fontRef>
+        </p:style>
+        <p:txBody>
+          <a:bodyPr rtlCol="0" anchor="ctr"/>
+          <a:lstStyle/>
+          <a:p>
+            <a:pPr algn="ctr"/>
+            <a:r>
+              <a:rPr lang="en-US" dirty="0" smtClean="0">
+                <a:solidFill>
+                  <a:schemeClr val="bg1"/>
+                </a:solidFill>
+              </a:rPr>
+              <a:t>4</a:t>
+            </a:r>
+            <a:endParaRPr lang="ru-RU" dirty="0">
+              <a:solidFill>
+                <a:schemeClr val="bg1"/>
+              </a:solidFill>
+            </a:endParaRPr>
+          </a:p>
+        </p:txBody>
+      </p:sp>
+      <p:sp>
+        <p:nvSpPr>
+          <p:cNvPr id="13" name="Скругленная прямоугольная выноска 12"/>
+          <p:cNvSpPr/>
+          <p:nvPr/>
+        </p:nvSpPr>
+        <p:spPr>
+          <a:xfrm>
+            <a:off x="5605462" y="2674970"/>
+            <a:ext cx="1504950" cy="450723"/>
+          </a:xfrm>
+          <a:prstGeom prst="wedgeRoundRectCallout">
+            <a:avLst>
+              <a:gd name="adj1" fmla="val -48781"/>
+              <a:gd name="adj2" fmla="val 92402"/>
+              <a:gd name="adj3" fmla="val 16667"/>
+            </a:avLst>
+          </a:prstGeom>
+          <a:solidFill>
+            <a:schemeClr val="bg1"/>
+          </a:solidFill>
+          <a:ln>
+            <a:solidFill>
+              <a:srgbClr val="FF0000"/>
+            </a:solidFill>
+          </a:ln>
+        </p:spPr>
+        <p:style>
+          <a:lnRef idx="2">
+            <a:schemeClr val="accent1">
+              <a:shade val="50000"/>
+            </a:schemeClr>
+          </a:lnRef>
+          <a:fillRef idx="1">
+            <a:schemeClr val="accent1"/>
+          </a:fillRef>
+          <a:effectRef idx="0">
+            <a:schemeClr val="accent1"/>
+          </a:effectRef>
+          <a:fontRef idx="minor">
+            <a:schemeClr val="lt1"/>
+          </a:fontRef>
+        </p:style>
+        <p:txBody>
+          <a:bodyPr rtlCol="0" anchor="ctr"/>
+          <a:lstStyle/>
+          <a:p>
+            <a:pPr algn="ctr"/>
+            <a:r>
+              <a:rPr lang="ru-RU" sz="1200" dirty="0" smtClean="0">
+                <a:solidFill>
+                  <a:srgbClr val="FF0000"/>
+                </a:solidFill>
+              </a:rPr>
+              <a:t>Входящие параметры запроса</a:t>
+            </a:r>
+            <a:endParaRPr lang="ru-RU" sz="1200" dirty="0">
+              <a:solidFill>
+                <a:srgbClr val="FF0000"/>
+              </a:solidFill>
+            </a:endParaRPr>
+          </a:p>
+        </p:txBody>
+      </p:sp>
+      <p:sp>
+        <p:nvSpPr>
+          <p:cNvPr id="14" name="Овал 13"/>
+          <p:cNvSpPr/>
+          <p:nvPr/>
+        </p:nvSpPr>
+        <p:spPr>
+          <a:xfrm>
+            <a:off x="9120187" y="1947861"/>
+            <a:ext cx="314325" cy="314325"/>
+          </a:xfrm>
+          <a:prstGeom prst="ellipse">
+            <a:avLst/>
+          </a:prstGeom>
+          <a:solidFill>
+            <a:srgbClr val="FF0000"/>
+          </a:solidFill>
+          <a:ln>
+            <a:noFill/>
+          </a:ln>
+        </p:spPr>
+        <p:style>
+          <a:lnRef idx="2">
+            <a:schemeClr val="accent1">
+              <a:shade val="50000"/>
+            </a:schemeClr>
+          </a:lnRef>
+          <a:fillRef idx="1">
+            <a:schemeClr val="accent1"/>
+          </a:fillRef>
+          <a:effectRef idx="0">
+            <a:schemeClr val="accent1"/>
+          </a:effectRef>
+          <a:fontRef idx="minor">
+            <a:schemeClr val="lt1"/>
+          </a:fontRef>
+        </p:style>
+        <p:txBody>
+          <a:bodyPr rtlCol="0" anchor="ctr"/>
+          <a:lstStyle/>
+          <a:p>
+            <a:pPr algn="ctr"/>
+            <a:r>
+              <a:rPr lang="ru-RU" dirty="0" smtClean="0">
+                <a:solidFill>
+                  <a:schemeClr val="bg1"/>
+                </a:solidFill>
+              </a:rPr>
+              <a:t>5</a:t>
+            </a:r>
+            <a:endParaRPr lang="ru-RU" dirty="0">
+              <a:solidFill>
+                <a:schemeClr val="bg1"/>
+              </a:solidFill>
+            </a:endParaRPr>
+          </a:p>
+        </p:txBody>
+      </p:sp>
+      <p:sp>
+        <p:nvSpPr>
+          <p:cNvPr id="15" name="Скругленная прямоугольная выноска 14"/>
+          <p:cNvSpPr/>
+          <p:nvPr/>
+        </p:nvSpPr>
+        <p:spPr>
+          <a:xfrm>
+            <a:off x="7224712" y="2190162"/>
+            <a:ext cx="1504950" cy="450723"/>
+          </a:xfrm>
+          <a:prstGeom prst="wedgeRoundRectCallout">
+            <a:avLst>
+              <a:gd name="adj1" fmla="val 72738"/>
+              <a:gd name="adj2" fmla="val -55527"/>
+              <a:gd name="adj3" fmla="val 16667"/>
+            </a:avLst>
+          </a:prstGeom>
+          <a:solidFill>
+            <a:schemeClr val="bg1"/>
+          </a:solidFill>
+          <a:ln>
+            <a:solidFill>
+              <a:srgbClr val="FF0000"/>
+            </a:solidFill>
+          </a:ln>
+        </p:spPr>
+        <p:style>
+          <a:lnRef idx="2">
+            <a:schemeClr val="accent1">
+              <a:shade val="50000"/>
+            </a:schemeClr>
+          </a:lnRef>
+          <a:fillRef idx="1">
+            <a:schemeClr val="accent1"/>
+          </a:fillRef>
+          <a:effectRef idx="0">
+            <a:schemeClr val="accent1"/>
+          </a:effectRef>
+          <a:fontRef idx="minor">
+            <a:schemeClr val="lt1"/>
+          </a:fontRef>
+        </p:style>
+        <p:txBody>
+          <a:bodyPr rtlCol="0" anchor="ctr"/>
+          <a:lstStyle/>
+          <a:p>
+            <a:pPr algn="ctr"/>
+            <a:r>
+              <a:rPr lang="ru-RU" sz="1200" dirty="0" smtClean="0">
+                <a:solidFill>
+                  <a:srgbClr val="FF0000"/>
+                </a:solidFill>
+              </a:rPr>
+              <a:t>Отправка запроса на сервер</a:t>
+            </a:r>
+            <a:endParaRPr lang="ru-RU" sz="1200" dirty="0">
+              <a:solidFill>
+                <a:srgbClr val="FF0000"/>
+              </a:solidFill>
+            </a:endParaRPr>
+          </a:p>
+        </p:txBody>
+      </p:sp>
+      <p:sp>
+        <p:nvSpPr>
+          <p:cNvPr id="16" name="Овал 15"/>
+          <p:cNvSpPr/>
+          <p:nvPr/>
+        </p:nvSpPr>
+        <p:spPr>
+          <a:xfrm>
+            <a:off x="8477249" y="1343022"/>
+            <a:ext cx="314325" cy="314325"/>
+          </a:xfrm>
+          <a:prstGeom prst="ellipse">
+            <a:avLst/>
+          </a:prstGeom>
+          <a:solidFill>
+            <a:srgbClr val="FF0000"/>
+          </a:solidFill>
+          <a:ln>
+            <a:noFill/>
+          </a:ln>
+        </p:spPr>
+        <p:style>
+          <a:lnRef idx="2">
+            <a:schemeClr val="accent1">
+              <a:shade val="50000"/>
+            </a:schemeClr>
+          </a:lnRef>
+          <a:fillRef idx="1">
+            <a:schemeClr val="accent1"/>
+          </a:fillRef>
+          <a:effectRef idx="0">
+            <a:schemeClr val="accent1"/>
+          </a:effectRef>
+          <a:fontRef idx="minor">
+            <a:schemeClr val="lt1"/>
+          </a:fontRef>
+        </p:style>
+        <p:txBody>
+          <a:bodyPr rtlCol="0" anchor="ctr"/>
+          <a:lstStyle/>
+          <a:p>
+            <a:pPr algn="ctr"/>
+            <a:r>
+              <a:rPr lang="ru-RU" dirty="0" smtClean="0">
+                <a:solidFill>
+                  <a:schemeClr val="bg1"/>
+                </a:solidFill>
+              </a:rPr>
+              <a:t>6</a:t>
+            </a:r>
+            <a:endParaRPr lang="ru-RU" dirty="0">
+              <a:solidFill>
+                <a:schemeClr val="bg1"/>
+              </a:solidFill>
+            </a:endParaRPr>
+          </a:p>
+        </p:txBody>
+      </p:sp>
+      <p:sp>
+        <p:nvSpPr>
+          <p:cNvPr id="17" name="Скругленная прямоугольная выноска 16"/>
+          <p:cNvSpPr/>
+          <p:nvPr/>
+        </p:nvSpPr>
+        <p:spPr>
+          <a:xfrm>
+            <a:off x="6198393" y="1103940"/>
+            <a:ext cx="1966912" cy="450723"/>
+          </a:xfrm>
+          <a:prstGeom prst="wedgeRoundRectCallout">
+            <a:avLst>
+              <a:gd name="adj1" fmla="val 65474"/>
+              <a:gd name="adj2" fmla="val 39570"/>
+              <a:gd name="adj3" fmla="val 16667"/>
+            </a:avLst>
+          </a:prstGeom>
+          <a:solidFill>
+            <a:schemeClr val="bg1"/>
+          </a:solidFill>
+          <a:ln>
+            <a:solidFill>
+              <a:srgbClr val="FF0000"/>
+            </a:solidFill>
+          </a:ln>
+        </p:spPr>
+        <p:style>
+          <a:lnRef idx="2">
+            <a:schemeClr val="accent1">
+              <a:shade val="50000"/>
+            </a:schemeClr>
+          </a:lnRef>
+          <a:fillRef idx="1">
+            <a:schemeClr val="accent1"/>
+          </a:fillRef>
+          <a:effectRef idx="0">
+            <a:schemeClr val="accent1"/>
+          </a:effectRef>
+          <a:fontRef idx="minor">
+            <a:schemeClr val="lt1"/>
+          </a:fontRef>
+        </p:style>
+        <p:txBody>
+          <a:bodyPr rtlCol="0" anchor="ctr"/>
+          <a:lstStyle/>
+          <a:p>
+            <a:pPr algn="ctr"/>
+            <a:r>
+              <a:rPr lang="ru-RU" sz="1200" dirty="0" smtClean="0">
+                <a:solidFill>
+                  <a:srgbClr val="FF0000"/>
+                </a:solidFill>
+              </a:rPr>
+              <a:t>Добавление примера ответа от сервера</a:t>
+            </a:r>
+            <a:endParaRPr lang="ru-RU" sz="1200" dirty="0">
+              <a:solidFill>
+                <a:srgbClr val="FF0000"/>
+              </a:solidFill>
+            </a:endParaRPr>
+          </a:p>
+        </p:txBody>
+      </p:sp>
+      <p:sp>
+        <p:nvSpPr>
+          <p:cNvPr id="18" name="Овал 17"/>
+          <p:cNvSpPr/>
+          <p:nvPr/>
+        </p:nvSpPr>
+        <p:spPr>
+          <a:xfrm>
+            <a:off x="10229849" y="2005009"/>
+            <a:ext cx="314325" cy="314325"/>
+          </a:xfrm>
+          <a:prstGeom prst="ellipse">
+            <a:avLst/>
+          </a:prstGeom>
+          <a:solidFill>
+            <a:srgbClr val="FF0000"/>
+          </a:solidFill>
+          <a:ln>
+            <a:noFill/>
+          </a:ln>
+        </p:spPr>
+        <p:style>
+          <a:lnRef idx="2">
+            <a:schemeClr val="accent1">
+              <a:shade val="50000"/>
+            </a:schemeClr>
+          </a:lnRef>
+          <a:fillRef idx="1">
+            <a:schemeClr val="accent1"/>
+          </a:fillRef>
+          <a:effectRef idx="0">
+            <a:schemeClr val="accent1"/>
+          </a:effectRef>
+          <a:fontRef idx="minor">
+            <a:schemeClr val="lt1"/>
+          </a:fontRef>
+        </p:style>
+        <p:txBody>
+          <a:bodyPr rtlCol="0" anchor="ctr"/>
+          <a:lstStyle/>
+          <a:p>
+            <a:pPr algn="ctr"/>
+            <a:r>
+              <a:rPr lang="ru-RU" dirty="0" smtClean="0">
+                <a:solidFill>
+                  <a:schemeClr val="bg1"/>
+                </a:solidFill>
+              </a:rPr>
+              <a:t>7</a:t>
+            </a:r>
+            <a:endParaRPr lang="ru-RU" dirty="0">
+              <a:solidFill>
+                <a:schemeClr val="bg1"/>
+              </a:solidFill>
+            </a:endParaRPr>
+          </a:p>
+        </p:txBody>
+      </p:sp>
+      <p:sp>
+        <p:nvSpPr>
+          <p:cNvPr id="19" name="Скругленная прямоугольная выноска 18"/>
+          <p:cNvSpPr/>
+          <p:nvPr/>
+        </p:nvSpPr>
+        <p:spPr>
+          <a:xfrm>
+            <a:off x="9386885" y="2512273"/>
+            <a:ext cx="1157289" cy="450723"/>
+          </a:xfrm>
+          <a:prstGeom prst="wedgeRoundRectCallout">
+            <a:avLst>
+              <a:gd name="adj1" fmla="val 33029"/>
+              <a:gd name="adj2" fmla="val -85112"/>
+              <a:gd name="adj3" fmla="val 16667"/>
+            </a:avLst>
+          </a:prstGeom>
+          <a:solidFill>
+            <a:schemeClr val="bg1"/>
+          </a:solidFill>
+          <a:ln>
+            <a:solidFill>
+              <a:srgbClr val="FF0000"/>
+            </a:solidFill>
+          </a:ln>
+        </p:spPr>
+        <p:style>
+          <a:lnRef idx="2">
+            <a:schemeClr val="accent1">
+              <a:shade val="50000"/>
+            </a:schemeClr>
+          </a:lnRef>
+          <a:fillRef idx="1">
+            <a:schemeClr val="accent1"/>
+          </a:fillRef>
+          <a:effectRef idx="0">
+            <a:schemeClr val="accent1"/>
+          </a:effectRef>
+          <a:fontRef idx="minor">
+            <a:schemeClr val="lt1"/>
+          </a:fontRef>
+        </p:style>
+        <p:txBody>
+          <a:bodyPr rtlCol="0" anchor="ctr"/>
+          <a:lstStyle/>
+          <a:p>
+            <a:pPr algn="ctr"/>
+            <a:r>
+              <a:rPr lang="ru-RU" sz="1200" dirty="0" smtClean="0">
+                <a:solidFill>
+                  <a:srgbClr val="FF0000"/>
+                </a:solidFill>
+              </a:rPr>
+              <a:t>Сохранение изменений</a:t>
+            </a:r>
+            <a:endParaRPr lang="ru-RU" sz="1200" dirty="0">
+              <a:solidFill>
+                <a:srgbClr val="FF0000"/>
+              </a:solidFill>
+            </a:endParaRPr>
+          </a:p>
+        </p:txBody>
+      </p:sp>
+      <p:sp>
+        <p:nvSpPr>
+          <p:cNvPr id="20" name="Скругленная прямоугольная выноска 19"/>
+          <p:cNvSpPr/>
+          <p:nvPr/>
+        </p:nvSpPr>
+        <p:spPr>
+          <a:xfrm>
+            <a:off x="4198143" y="5091894"/>
+            <a:ext cx="1512094" cy="450723"/>
+          </a:xfrm>
+          <a:prstGeom prst="wedgeRoundRectCallout">
+            <a:avLst>
+              <a:gd name="adj1" fmla="val -79250"/>
+              <a:gd name="adj2" fmla="val 50136"/>
+              <a:gd name="adj3" fmla="val 16667"/>
+            </a:avLst>
+          </a:prstGeom>
+          <a:solidFill>
+            <a:schemeClr val="bg1"/>
+          </a:solidFill>
+          <a:ln>
+            <a:solidFill>
+              <a:srgbClr val="FF0000"/>
+            </a:solidFill>
+          </a:ln>
+        </p:spPr>
+        <p:style>
+          <a:lnRef idx="2">
+            <a:schemeClr val="accent1">
+              <a:shade val="50000"/>
+            </a:schemeClr>
+          </a:lnRef>
+          <a:fillRef idx="1">
+            <a:schemeClr val="accent1"/>
+          </a:fillRef>
+          <a:effectRef idx="0">
+            <a:schemeClr val="accent1"/>
+          </a:effectRef>
+          <a:fontRef idx="minor">
+            <a:schemeClr val="lt1"/>
+          </a:fontRef>
+        </p:style>
+        <p:txBody>
+          <a:bodyPr rtlCol="0" anchor="ctr"/>
+          <a:lstStyle/>
+          <a:p>
+            <a:pPr algn="ctr"/>
+            <a:r>
+              <a:rPr lang="ru-RU" sz="1200" dirty="0" smtClean="0">
+                <a:solidFill>
+                  <a:srgbClr val="FF0000"/>
+                </a:solidFill>
+              </a:rPr>
+              <a:t>Ответ от сервера в формате </a:t>
+            </a:r>
+            <a:r>
+              <a:rPr lang="en-US" sz="1200" dirty="0" smtClean="0">
+                <a:solidFill>
+                  <a:srgbClr val="FF0000"/>
+                </a:solidFill>
+              </a:rPr>
+              <a:t>JSON</a:t>
+            </a:r>
+            <a:endParaRPr lang="ru-RU" sz="1200" dirty="0">
+              <a:solidFill>
+                <a:srgbClr val="FF0000"/>
+              </a:solidFill>
+            </a:endParaRPr>
+          </a:p>
+        </p:txBody>
+      </p:sp>
+    </p:spTree>
+    <p:extLst>
+      <p:ext uri="{BB962C8B-B14F-4D97-AF65-F5344CB8AC3E}">
+        <p14:creationId xmlns:p14="http://schemas.microsoft.com/office/powerpoint/2010/main" val="2637337088"/>
+      </p:ext>
+    </p:extLst>
+  </p:cSld>
+  <p:clrMapOvr>
+    <a:masterClrMapping/>
+  </p:clrMapOvr>
+</p:sld>
+</file>
+
+<file path=ppt/slides/slide3.xml><?xml version="1.0" encoding="utf-8"?>
+<p:sld xmlns:a="http://schemas.openxmlformats.org/drawingml/2006/main" xmlns:r="http://schemas.openxmlformats.org/officeDocument/2006/relationships" xmlns:p="http://schemas.openxmlformats.org/presentationml/2006/main">
+  <p:cSld>
+    <p:spTree>
+      <p:nvGrpSpPr>
+        <p:cNvPr id="1" name=""/>
+        <p:cNvGrpSpPr/>
+        <p:nvPr/>
+      </p:nvGrpSpPr>
+      <p:grpSpPr>
+        <a:xfrm>
+          <a:off x="0" y="0"/>
+          <a:ext cx="0" cy="0"/>
+          <a:chOff x="0" y="0"/>
+          <a:chExt cx="0" cy="0"/>
+        </a:xfrm>
+      </p:grpSpPr>
+      <p:pic>
+        <p:nvPicPr>
+          <p:cNvPr id="4" name="Рисунок 3"/>
+          <p:cNvPicPr>
+            <a:picLocks noChangeAspect="1"/>
+          </p:cNvPicPr>
+          <p:nvPr/>
+        </p:nvPicPr>
+        <p:blipFill>
+          <a:blip r:embed="rId2">
+            <a:extLst>
+              <a:ext uri="{28A0092B-C50C-407E-A947-70E740481C1C}">
+                <a14:useLocalDpi xmlns:a14="http://schemas.microsoft.com/office/drawing/2010/main" val="0"/>
+              </a:ext>
+            </a:extLst>
+          </a:blip>
+          <a:stretch>
+            <a:fillRect/>
+          </a:stretch>
+        </p:blipFill>
+        <p:spPr>
+          <a:xfrm>
+            <a:off x="85725" y="2271713"/>
+            <a:ext cx="4252913" cy="2371662"/>
+          </a:xfrm>
+          <a:prstGeom prst="rect">
+            <a:avLst/>
+          </a:prstGeom>
+        </p:spPr>
+      </p:pic>
+      <p:pic>
+        <p:nvPicPr>
+          <p:cNvPr id="5" name="Рисунок 4"/>
+          <p:cNvPicPr>
+            <a:picLocks noChangeAspect="1"/>
+          </p:cNvPicPr>
+          <p:nvPr/>
+        </p:nvPicPr>
+        <p:blipFill>
+          <a:blip r:embed="rId3">
+            <a:extLst>
+              <a:ext uri="{28A0092B-C50C-407E-A947-70E740481C1C}">
+                <a14:useLocalDpi xmlns:a14="http://schemas.microsoft.com/office/drawing/2010/main" val="0"/>
+              </a:ext>
+            </a:extLst>
+          </a:blip>
+          <a:stretch>
+            <a:fillRect/>
+          </a:stretch>
+        </p:blipFill>
+        <p:spPr>
+          <a:xfrm>
+            <a:off x="4439873" y="902475"/>
+            <a:ext cx="7618777" cy="4731999"/>
+          </a:xfrm>
+          <a:prstGeom prst="rect">
+            <a:avLst/>
+          </a:prstGeom>
+        </p:spPr>
+      </p:pic>
+      <p:sp>
+        <p:nvSpPr>
+          <p:cNvPr id="6" name="Овал 5"/>
+          <p:cNvSpPr/>
+          <p:nvPr/>
+        </p:nvSpPr>
+        <p:spPr>
+          <a:xfrm>
+            <a:off x="1897856" y="2690812"/>
+            <a:ext cx="314325" cy="314325"/>
+          </a:xfrm>
+          <a:prstGeom prst="ellipse">
+            <a:avLst/>
+          </a:prstGeom>
+          <a:solidFill>
+            <a:srgbClr val="FF0000"/>
+          </a:solidFill>
+          <a:ln>
+            <a:noFill/>
+          </a:ln>
+        </p:spPr>
+        <p:style>
+          <a:lnRef idx="2">
+            <a:schemeClr val="accent1">
+              <a:shade val="50000"/>
+            </a:schemeClr>
+          </a:lnRef>
+          <a:fillRef idx="1">
+            <a:schemeClr val="accent1"/>
+          </a:fillRef>
+          <a:effectRef idx="0">
+            <a:schemeClr val="accent1"/>
+          </a:effectRef>
+          <a:fontRef idx="minor">
+            <a:schemeClr val="lt1"/>
+          </a:fontRef>
+        </p:style>
+        <p:txBody>
+          <a:bodyPr rtlCol="0" anchor="ctr"/>
+          <a:lstStyle/>
+          <a:p>
+            <a:pPr algn="ctr"/>
+            <a:r>
+              <a:rPr lang="ru-RU" dirty="0" smtClean="0">
+                <a:solidFill>
+                  <a:schemeClr val="bg1"/>
+                </a:solidFill>
+              </a:rPr>
+              <a:t>1</a:t>
+            </a:r>
+            <a:endParaRPr lang="ru-RU" dirty="0">
+              <a:solidFill>
+                <a:schemeClr val="bg1"/>
+              </a:solidFill>
+            </a:endParaRPr>
+          </a:p>
+        </p:txBody>
+      </p:sp>
+      <p:sp>
+        <p:nvSpPr>
+          <p:cNvPr id="7" name="Скругленная прямоугольная выноска 6"/>
+          <p:cNvSpPr/>
+          <p:nvPr/>
+        </p:nvSpPr>
+        <p:spPr>
+          <a:xfrm>
+            <a:off x="361951" y="2143124"/>
+            <a:ext cx="1485288" cy="547687"/>
+          </a:xfrm>
+          <a:prstGeom prst="wedgeRoundRectCallout">
+            <a:avLst>
+              <a:gd name="adj1" fmla="val 47133"/>
+              <a:gd name="adj2" fmla="val 76340"/>
+              <a:gd name="adj3" fmla="val 16667"/>
+            </a:avLst>
+          </a:prstGeom>
+          <a:solidFill>
+            <a:schemeClr val="bg1"/>
+          </a:solidFill>
+          <a:ln>
+            <a:solidFill>
+              <a:srgbClr val="FF0000"/>
+            </a:solidFill>
+          </a:ln>
+        </p:spPr>
+        <p:style>
+          <a:lnRef idx="2">
+            <a:schemeClr val="accent1">
+              <a:shade val="50000"/>
+            </a:schemeClr>
+          </a:lnRef>
+          <a:fillRef idx="1">
+            <a:schemeClr val="accent1"/>
+          </a:fillRef>
+          <a:effectRef idx="0">
+            <a:schemeClr val="accent1"/>
+          </a:effectRef>
+          <a:fontRef idx="minor">
+            <a:schemeClr val="lt1"/>
+          </a:fontRef>
+        </p:style>
+        <p:txBody>
+          <a:bodyPr rtlCol="0" anchor="ctr"/>
+          <a:lstStyle/>
+          <a:p>
+            <a:pPr algn="ctr"/>
+            <a:r>
+              <a:rPr lang="ru-RU" sz="1200" dirty="0" smtClean="0">
+                <a:solidFill>
+                  <a:srgbClr val="FF0000"/>
+                </a:solidFill>
+              </a:rPr>
+              <a:t>Примеры ответов от сервера</a:t>
+            </a:r>
+            <a:endParaRPr lang="ru-RU" sz="1200" dirty="0">
+              <a:solidFill>
+                <a:srgbClr val="FF0000"/>
+              </a:solidFill>
+            </a:endParaRPr>
+          </a:p>
+        </p:txBody>
+      </p:sp>
+      <p:sp>
+        <p:nvSpPr>
+          <p:cNvPr id="8" name="Овал 7"/>
+          <p:cNvSpPr/>
+          <p:nvPr/>
+        </p:nvSpPr>
+        <p:spPr>
+          <a:xfrm>
+            <a:off x="2212181" y="3871912"/>
+            <a:ext cx="314325" cy="314325"/>
+          </a:xfrm>
+          <a:prstGeom prst="ellipse">
+            <a:avLst/>
+          </a:prstGeom>
+          <a:solidFill>
+            <a:srgbClr val="FF0000"/>
+          </a:solidFill>
+          <a:ln>
+            <a:noFill/>
+          </a:ln>
+        </p:spPr>
+        <p:style>
+          <a:lnRef idx="2">
+            <a:schemeClr val="accent1">
+              <a:shade val="50000"/>
+            </a:schemeClr>
+          </a:lnRef>
+          <a:fillRef idx="1">
+            <a:schemeClr val="accent1"/>
+          </a:fillRef>
+          <a:effectRef idx="0">
+            <a:schemeClr val="accent1"/>
+          </a:effectRef>
+          <a:fontRef idx="minor">
+            <a:schemeClr val="lt1"/>
+          </a:fontRef>
+        </p:style>
+        <p:txBody>
+          <a:bodyPr rtlCol="0" anchor="ctr"/>
+          <a:lstStyle/>
+          <a:p>
+            <a:pPr algn="ctr"/>
+            <a:r>
+              <a:rPr lang="ru-RU" dirty="0" smtClean="0">
+                <a:solidFill>
+                  <a:schemeClr val="bg1"/>
+                </a:solidFill>
+              </a:rPr>
+              <a:t>2</a:t>
+            </a:r>
+            <a:endParaRPr lang="ru-RU" dirty="0">
+              <a:solidFill>
+                <a:schemeClr val="bg1"/>
+              </a:solidFill>
+            </a:endParaRPr>
+          </a:p>
+        </p:txBody>
+      </p:sp>
+      <p:sp>
+        <p:nvSpPr>
+          <p:cNvPr id="9" name="Овал 8"/>
+          <p:cNvSpPr/>
+          <p:nvPr/>
+        </p:nvSpPr>
+        <p:spPr>
+          <a:xfrm>
+            <a:off x="10956131" y="1084293"/>
+            <a:ext cx="314325" cy="314325"/>
+          </a:xfrm>
+          <a:prstGeom prst="ellipse">
+            <a:avLst/>
+          </a:prstGeom>
+          <a:solidFill>
+            <a:srgbClr val="FF0000"/>
+          </a:solidFill>
+          <a:ln>
+            <a:noFill/>
+          </a:ln>
+        </p:spPr>
+        <p:style>
+          <a:lnRef idx="2">
+            <a:schemeClr val="accent1">
+              <a:shade val="50000"/>
+            </a:schemeClr>
+          </a:lnRef>
+          <a:fillRef idx="1">
+            <a:schemeClr val="accent1"/>
+          </a:fillRef>
+          <a:effectRef idx="0">
+            <a:schemeClr val="accent1"/>
+          </a:effectRef>
+          <a:fontRef idx="minor">
+            <a:schemeClr val="lt1"/>
+          </a:fontRef>
+        </p:style>
+        <p:txBody>
+          <a:bodyPr rtlCol="0" anchor="ctr"/>
+          <a:lstStyle/>
+          <a:p>
+            <a:pPr algn="ctr"/>
+            <a:r>
+              <a:rPr lang="ru-RU" dirty="0" smtClean="0">
+                <a:solidFill>
+                  <a:schemeClr val="bg1"/>
+                </a:solidFill>
+              </a:rPr>
+              <a:t>3</a:t>
+            </a:r>
+            <a:endParaRPr lang="ru-RU" dirty="0">
+              <a:solidFill>
+                <a:schemeClr val="bg1"/>
+              </a:solidFill>
+            </a:endParaRPr>
+          </a:p>
+        </p:txBody>
+      </p:sp>
+      <p:sp>
+        <p:nvSpPr>
+          <p:cNvPr id="10" name="Скругленная прямоугольная выноска 9"/>
+          <p:cNvSpPr/>
+          <p:nvPr/>
+        </p:nvSpPr>
+        <p:spPr>
+          <a:xfrm>
+            <a:off x="2571750" y="3386327"/>
+            <a:ext cx="1076325" cy="450723"/>
+          </a:xfrm>
+          <a:prstGeom prst="wedgeRoundRectCallout">
+            <a:avLst>
+              <a:gd name="adj1" fmla="val -48781"/>
+              <a:gd name="adj2" fmla="val 92402"/>
+              <a:gd name="adj3" fmla="val 16667"/>
+            </a:avLst>
+          </a:prstGeom>
+          <a:solidFill>
+            <a:schemeClr val="bg1"/>
+          </a:solidFill>
+          <a:ln>
+            <a:solidFill>
+              <a:srgbClr val="FF0000"/>
+            </a:solidFill>
+          </a:ln>
+        </p:spPr>
+        <p:style>
+          <a:lnRef idx="2">
+            <a:schemeClr val="accent1">
+              <a:shade val="50000"/>
+            </a:schemeClr>
+          </a:lnRef>
+          <a:fillRef idx="1">
+            <a:schemeClr val="accent1"/>
+          </a:fillRef>
+          <a:effectRef idx="0">
+            <a:schemeClr val="accent1"/>
+          </a:effectRef>
+          <a:fontRef idx="minor">
+            <a:schemeClr val="lt1"/>
+          </a:fontRef>
+        </p:style>
+        <p:txBody>
+          <a:bodyPr rtlCol="0" anchor="ctr"/>
+          <a:lstStyle/>
+          <a:p>
+            <a:pPr algn="ctr"/>
+            <a:r>
+              <a:rPr lang="ru-RU" sz="1200" dirty="0" smtClean="0">
+                <a:solidFill>
+                  <a:srgbClr val="FF0000"/>
+                </a:solidFill>
+              </a:rPr>
+              <a:t>Добавить пример</a:t>
+            </a:r>
+            <a:endParaRPr lang="ru-RU" sz="1200" dirty="0">
+              <a:solidFill>
+                <a:srgbClr val="FF0000"/>
+              </a:solidFill>
+            </a:endParaRPr>
+          </a:p>
+        </p:txBody>
+      </p:sp>
+      <p:sp>
+        <p:nvSpPr>
+          <p:cNvPr id="11" name="Скругленная прямоугольная выноска 10"/>
+          <p:cNvSpPr/>
+          <p:nvPr/>
+        </p:nvSpPr>
+        <p:spPr>
+          <a:xfrm>
+            <a:off x="9372601" y="1476374"/>
+            <a:ext cx="1485288" cy="547687"/>
+          </a:xfrm>
+          <a:prstGeom prst="wedgeRoundRectCallout">
+            <a:avLst>
+              <a:gd name="adj1" fmla="val 52263"/>
+              <a:gd name="adj2" fmla="val -76704"/>
+              <a:gd name="adj3" fmla="val 16667"/>
+            </a:avLst>
+          </a:prstGeom>
+          <a:solidFill>
+            <a:schemeClr val="bg1"/>
+          </a:solidFill>
+          <a:ln>
+            <a:solidFill>
+              <a:srgbClr val="FF0000"/>
+            </a:solidFill>
+          </a:ln>
+        </p:spPr>
+        <p:style>
+          <a:lnRef idx="2">
+            <a:schemeClr val="accent1">
+              <a:shade val="50000"/>
+            </a:schemeClr>
+          </a:lnRef>
+          <a:fillRef idx="1">
+            <a:schemeClr val="accent1"/>
+          </a:fillRef>
+          <a:effectRef idx="0">
+            <a:schemeClr val="accent1"/>
+          </a:effectRef>
+          <a:fontRef idx="minor">
+            <a:schemeClr val="lt1"/>
+          </a:fontRef>
+        </p:style>
+        <p:txBody>
+          <a:bodyPr rtlCol="0" anchor="ctr"/>
+          <a:lstStyle/>
+          <a:p>
+            <a:pPr algn="ctr"/>
+            <a:r>
+              <a:rPr lang="ru-RU" sz="1200" smtClean="0">
+                <a:solidFill>
+                  <a:srgbClr val="FF0000"/>
+                </a:solidFill>
+              </a:rPr>
+              <a:t>Сохранить пример</a:t>
+            </a:r>
+            <a:endParaRPr lang="ru-RU" sz="1200" dirty="0">
+              <a:solidFill>
+                <a:srgbClr val="FF0000"/>
+              </a:solidFill>
+            </a:endParaRPr>
+          </a:p>
+        </p:txBody>
+      </p:sp>
+    </p:spTree>
+    <p:extLst>
+      <p:ext uri="{BB962C8B-B14F-4D97-AF65-F5344CB8AC3E}">
+        <p14:creationId xmlns:p14="http://schemas.microsoft.com/office/powerpoint/2010/main" val="3369203301"/>
+      </p:ext>
+    </p:extLst>
+  </p:cSld>
+  <p:clrMapOvr>
+    <a:masterClrMapping/>
+  </p:clrMapOvr>
+</p:sld>
+</file>
+
 <file path=ppt/theme/theme1.xml><?xml version="1.0" encoding="utf-8"?>
 <a:theme xmlns:a="http://schemas.openxmlformats.org/drawingml/2006/main" name="Тема Office">
   <a:themeElements>

</xml_diff>

<commit_message>
'master: init commit Вс янв 10 17:31:23 MSK 2021'
</commit_message>
<xml_diff>
--- a/My/OLD/Презентация Microsoft PowerPoint.pptx
+++ b/My/OLD/Презентация Microsoft PowerPoint.pptx
@@ -4438,13 +4438,32 @@
           <a:p>
             <a:pPr algn="ctr"/>
             <a:r>
-              <a:rPr lang="ru-RU" sz="1200" smtClean="0">
+              <a:rPr lang="ru-RU" sz="1200" dirty="0" smtClean="0">
                 <a:solidFill>
                   <a:srgbClr val="FF0000"/>
                 </a:solidFill>
               </a:rPr>
               <a:t>Сохранить пример</a:t>
             </a:r>
+          </a:p>
+          <a:p>
+            <a:pPr algn="ctr"/>
+            <a:endParaRPr lang="ru-RU" sz="1200" dirty="0">
+              <a:solidFill>
+                <a:srgbClr val="FF0000"/>
+              </a:solidFill>
+            </a:endParaRPr>
+          </a:p>
+          <a:p>
+            <a:pPr algn="ctr"/>
+            <a:endParaRPr lang="ru-RU" sz="1200" dirty="0" smtClean="0">
+              <a:solidFill>
+                <a:srgbClr val="FF0000"/>
+              </a:solidFill>
+            </a:endParaRPr>
+          </a:p>
+          <a:p>
+            <a:pPr algn="ctr"/>
             <a:endParaRPr lang="ru-RU" sz="1200" dirty="0">
               <a:solidFill>
                 <a:srgbClr val="FF0000"/>

</xml_diff>

<commit_message>
'master: init commit Пт янв 15 17:37:06 MSK 2021'
</commit_message>
<xml_diff>
--- a/My/OLD/Презентация Microsoft PowerPoint.pptx
+++ b/My/OLD/Презентация Microsoft PowerPoint.pptx
@@ -6,8 +6,9 @@
   </p:sldMasterIdLst>
   <p:sldIdLst>
     <p:sldId id="256" r:id="rId2"/>
-    <p:sldId id="257" r:id="rId3"/>
-    <p:sldId id="258" r:id="rId4"/>
+    <p:sldId id="259" r:id="rId3"/>
+    <p:sldId id="257" r:id="rId4"/>
+    <p:sldId id="258" r:id="rId5"/>
   </p:sldIdLst>
   <p:sldSz cx="12192000" cy="6858000"/>
   <p:notesSz cx="6858000" cy="9144000"/>
@@ -106,6 +107,11 @@
       </a:defRPr>
     </a:lvl9pPr>
   </p:defaultTextStyle>
+  <p:extLst>
+    <p:ext uri="{EFAFB233-063F-42B5-8137-9DF3F51BA10A}">
+      <p15:sldGuideLst xmlns:p15="http://schemas.microsoft.com/office/powerpoint/2012/main"/>
+    </p:ext>
+  </p:extLst>
 </p:presentation>
 </file>
 
@@ -240,7 +246,7 @@
           <a:p>
             <a:fld id="{AC82883B-63A8-447F-80BA-2BA680915AAD}" type="datetimeFigureOut">
               <a:rPr lang="ru-RU" smtClean="0"/>
-              <a:t>09.01.2021</a:t>
+              <a:t>15.01.2021</a:t>
             </a:fld>
             <a:endParaRPr lang="ru-RU"/>
           </a:p>
@@ -410,7 +416,7 @@
           <a:p>
             <a:fld id="{AC82883B-63A8-447F-80BA-2BA680915AAD}" type="datetimeFigureOut">
               <a:rPr lang="ru-RU" smtClean="0"/>
-              <a:t>09.01.2021</a:t>
+              <a:t>15.01.2021</a:t>
             </a:fld>
             <a:endParaRPr lang="ru-RU"/>
           </a:p>
@@ -590,7 +596,7 @@
           <a:p>
             <a:fld id="{AC82883B-63A8-447F-80BA-2BA680915AAD}" type="datetimeFigureOut">
               <a:rPr lang="ru-RU" smtClean="0"/>
-              <a:t>09.01.2021</a:t>
+              <a:t>15.01.2021</a:t>
             </a:fld>
             <a:endParaRPr lang="ru-RU"/>
           </a:p>
@@ -760,7 +766,7 @@
           <a:p>
             <a:fld id="{AC82883B-63A8-447F-80BA-2BA680915AAD}" type="datetimeFigureOut">
               <a:rPr lang="ru-RU" smtClean="0"/>
-              <a:t>09.01.2021</a:t>
+              <a:t>15.01.2021</a:t>
             </a:fld>
             <a:endParaRPr lang="ru-RU"/>
           </a:p>
@@ -1006,7 +1012,7 @@
           <a:p>
             <a:fld id="{AC82883B-63A8-447F-80BA-2BA680915AAD}" type="datetimeFigureOut">
               <a:rPr lang="ru-RU" smtClean="0"/>
-              <a:t>09.01.2021</a:t>
+              <a:t>15.01.2021</a:t>
             </a:fld>
             <a:endParaRPr lang="ru-RU"/>
           </a:p>
@@ -1238,7 +1244,7 @@
           <a:p>
             <a:fld id="{AC82883B-63A8-447F-80BA-2BA680915AAD}" type="datetimeFigureOut">
               <a:rPr lang="ru-RU" smtClean="0"/>
-              <a:t>09.01.2021</a:t>
+              <a:t>15.01.2021</a:t>
             </a:fld>
             <a:endParaRPr lang="ru-RU"/>
           </a:p>
@@ -1605,7 +1611,7 @@
           <a:p>
             <a:fld id="{AC82883B-63A8-447F-80BA-2BA680915AAD}" type="datetimeFigureOut">
               <a:rPr lang="ru-RU" smtClean="0"/>
-              <a:t>09.01.2021</a:t>
+              <a:t>15.01.2021</a:t>
             </a:fld>
             <a:endParaRPr lang="ru-RU"/>
           </a:p>
@@ -1723,7 +1729,7 @@
           <a:p>
             <a:fld id="{AC82883B-63A8-447F-80BA-2BA680915AAD}" type="datetimeFigureOut">
               <a:rPr lang="ru-RU" smtClean="0"/>
-              <a:t>09.01.2021</a:t>
+              <a:t>15.01.2021</a:t>
             </a:fld>
             <a:endParaRPr lang="ru-RU"/>
           </a:p>
@@ -1818,7 +1824,7 @@
           <a:p>
             <a:fld id="{AC82883B-63A8-447F-80BA-2BA680915AAD}" type="datetimeFigureOut">
               <a:rPr lang="ru-RU" smtClean="0"/>
-              <a:t>09.01.2021</a:t>
+              <a:t>15.01.2021</a:t>
             </a:fld>
             <a:endParaRPr lang="ru-RU"/>
           </a:p>
@@ -2095,7 +2101,7 @@
           <a:p>
             <a:fld id="{AC82883B-63A8-447F-80BA-2BA680915AAD}" type="datetimeFigureOut">
               <a:rPr lang="ru-RU" smtClean="0"/>
-              <a:t>09.01.2021</a:t>
+              <a:t>15.01.2021</a:t>
             </a:fld>
             <a:endParaRPr lang="ru-RU"/>
           </a:p>
@@ -2348,7 +2354,7 @@
           <a:p>
             <a:fld id="{AC82883B-63A8-447F-80BA-2BA680915AAD}" type="datetimeFigureOut">
               <a:rPr lang="ru-RU" smtClean="0"/>
-              <a:t>09.01.2021</a:t>
+              <a:t>15.01.2021</a:t>
             </a:fld>
             <a:endParaRPr lang="ru-RU"/>
           </a:p>
@@ -2561,7 +2567,7 @@
           <a:p>
             <a:fld id="{AC82883B-63A8-447F-80BA-2BA680915AAD}" type="datetimeFigureOut">
               <a:rPr lang="ru-RU" smtClean="0"/>
-              <a:t>09.01.2021</a:t>
+              <a:t>15.01.2021</a:t>
             </a:fld>
             <a:endParaRPr lang="ru-RU"/>
           </a:p>
@@ -3107,6 +3113,560 @@
       </p:grpSpPr>
       <p:pic>
         <p:nvPicPr>
+          <p:cNvPr id="4" name="Рисунок 3"/>
+          <p:cNvPicPr>
+            <a:picLocks noChangeAspect="1"/>
+          </p:cNvPicPr>
+          <p:nvPr/>
+        </p:nvPicPr>
+        <p:blipFill>
+          <a:blip r:embed="rId2">
+            <a:extLst>
+              <a:ext uri="{28A0092B-C50C-407E-A947-70E740481C1C}">
+                <a14:useLocalDpi xmlns:a14="http://schemas.microsoft.com/office/drawing/2010/main" val="0"/>
+              </a:ext>
+            </a:extLst>
+          </a:blip>
+          <a:stretch>
+            <a:fillRect/>
+          </a:stretch>
+        </p:blipFill>
+        <p:spPr>
+          <a:xfrm>
+            <a:off x="1122365" y="333374"/>
+            <a:ext cx="4738280" cy="5981701"/>
+          </a:xfrm>
+          <a:prstGeom prst="rect">
+            <a:avLst/>
+          </a:prstGeom>
+        </p:spPr>
+      </p:pic>
+      <p:sp>
+        <p:nvSpPr>
+          <p:cNvPr id="5" name="Прямоугольник 4"/>
+          <p:cNvSpPr/>
+          <p:nvPr/>
+        </p:nvSpPr>
+        <p:spPr>
+          <a:xfrm>
+            <a:off x="7572376" y="333374"/>
+            <a:ext cx="742950" cy="438150"/>
+          </a:xfrm>
+          <a:prstGeom prst="rect">
+            <a:avLst/>
+          </a:prstGeom>
+          <a:noFill/>
+          <a:ln w="19050"/>
+        </p:spPr>
+        <p:style>
+          <a:lnRef idx="2">
+            <a:schemeClr val="accent1">
+              <a:shade val="50000"/>
+            </a:schemeClr>
+          </a:lnRef>
+          <a:fillRef idx="1">
+            <a:schemeClr val="accent1"/>
+          </a:fillRef>
+          <a:effectRef idx="0">
+            <a:schemeClr val="accent1"/>
+          </a:effectRef>
+          <a:fontRef idx="minor">
+            <a:schemeClr val="lt1"/>
+          </a:fontRef>
+        </p:style>
+        <p:txBody>
+          <a:bodyPr rtlCol="0" anchor="ctr"/>
+          <a:lstStyle/>
+          <a:p>
+            <a:pPr algn="ctr"/>
+            <a:r>
+              <a:rPr lang="en-US" dirty="0" smtClean="0">
+                <a:solidFill>
+                  <a:schemeClr val="tx1"/>
+                </a:solidFill>
+              </a:rPr>
+              <a:t>API</a:t>
+            </a:r>
+            <a:endParaRPr lang="ru-RU" dirty="0">
+              <a:solidFill>
+                <a:schemeClr val="tx1"/>
+              </a:solidFill>
+            </a:endParaRPr>
+          </a:p>
+        </p:txBody>
+      </p:sp>
+      <p:sp>
+        <p:nvSpPr>
+          <p:cNvPr id="6" name="Прямоугольник 5"/>
+          <p:cNvSpPr/>
+          <p:nvPr/>
+        </p:nvSpPr>
+        <p:spPr>
+          <a:xfrm>
+            <a:off x="6619876" y="1200149"/>
+            <a:ext cx="742950" cy="438150"/>
+          </a:xfrm>
+          <a:prstGeom prst="rect">
+            <a:avLst/>
+          </a:prstGeom>
+          <a:noFill/>
+          <a:ln w="19050"/>
+        </p:spPr>
+        <p:style>
+          <a:lnRef idx="2">
+            <a:schemeClr val="accent1">
+              <a:shade val="50000"/>
+            </a:schemeClr>
+          </a:lnRef>
+          <a:fillRef idx="1">
+            <a:schemeClr val="accent1"/>
+          </a:fillRef>
+          <a:effectRef idx="0">
+            <a:schemeClr val="accent1"/>
+          </a:effectRef>
+          <a:fontRef idx="minor">
+            <a:schemeClr val="lt1"/>
+          </a:fontRef>
+        </p:style>
+        <p:txBody>
+          <a:bodyPr rtlCol="0" anchor="ctr"/>
+          <a:lstStyle/>
+          <a:p>
+            <a:pPr algn="ctr"/>
+            <a:r>
+              <a:rPr lang="en-US" dirty="0" smtClean="0">
+                <a:solidFill>
+                  <a:schemeClr val="tx1"/>
+                </a:solidFill>
+              </a:rPr>
+              <a:t>Red</a:t>
+            </a:r>
+            <a:endParaRPr lang="ru-RU" dirty="0">
+              <a:solidFill>
+                <a:schemeClr val="tx1"/>
+              </a:solidFill>
+            </a:endParaRPr>
+          </a:p>
+        </p:txBody>
+      </p:sp>
+      <p:sp>
+        <p:nvSpPr>
+          <p:cNvPr id="7" name="Прямоугольник 6"/>
+          <p:cNvSpPr/>
+          <p:nvPr/>
+        </p:nvSpPr>
+        <p:spPr>
+          <a:xfrm>
+            <a:off x="8315326" y="1200149"/>
+            <a:ext cx="955268" cy="438150"/>
+          </a:xfrm>
+          <a:prstGeom prst="rect">
+            <a:avLst/>
+          </a:prstGeom>
+          <a:noFill/>
+          <a:ln w="19050"/>
+        </p:spPr>
+        <p:style>
+          <a:lnRef idx="2">
+            <a:schemeClr val="accent1">
+              <a:shade val="50000"/>
+            </a:schemeClr>
+          </a:lnRef>
+          <a:fillRef idx="1">
+            <a:schemeClr val="accent1"/>
+          </a:fillRef>
+          <a:effectRef idx="0">
+            <a:schemeClr val="accent1"/>
+          </a:effectRef>
+          <a:fontRef idx="minor">
+            <a:schemeClr val="lt1"/>
+          </a:fontRef>
+        </p:style>
+        <p:txBody>
+          <a:bodyPr rtlCol="0" anchor="ctr"/>
+          <a:lstStyle/>
+          <a:p>
+            <a:pPr algn="ctr"/>
+            <a:r>
+              <a:rPr lang="en-US" dirty="0" smtClean="0">
+                <a:solidFill>
+                  <a:schemeClr val="tx1"/>
+                </a:solidFill>
+              </a:rPr>
+              <a:t>Orange</a:t>
+            </a:r>
+            <a:endParaRPr lang="ru-RU" dirty="0">
+              <a:solidFill>
+                <a:schemeClr val="tx1"/>
+              </a:solidFill>
+            </a:endParaRPr>
+          </a:p>
+        </p:txBody>
+      </p:sp>
+      <p:cxnSp>
+        <p:nvCxnSpPr>
+          <p:cNvPr id="11" name="Прямая соединительная линия 10"/>
+          <p:cNvCxnSpPr>
+            <a:stCxn id="5" idx="2"/>
+            <a:endCxn id="6" idx="0"/>
+          </p:cNvCxnSpPr>
+          <p:nvPr/>
+        </p:nvCxnSpPr>
+        <p:spPr>
+          <a:xfrm flipH="1">
+            <a:off x="6991351" y="771524"/>
+            <a:ext cx="952500" cy="428625"/>
+          </a:xfrm>
+          <a:prstGeom prst="line">
+            <a:avLst/>
+          </a:prstGeom>
+          <a:ln w="19050"/>
+        </p:spPr>
+        <p:style>
+          <a:lnRef idx="1">
+            <a:schemeClr val="accent1"/>
+          </a:lnRef>
+          <a:fillRef idx="0">
+            <a:schemeClr val="accent1"/>
+          </a:fillRef>
+          <a:effectRef idx="0">
+            <a:schemeClr val="accent1"/>
+          </a:effectRef>
+          <a:fontRef idx="minor">
+            <a:schemeClr val="tx1"/>
+          </a:fontRef>
+        </p:style>
+      </p:cxnSp>
+      <p:cxnSp>
+        <p:nvCxnSpPr>
+          <p:cNvPr id="12" name="Прямая соединительная линия 11"/>
+          <p:cNvCxnSpPr>
+            <a:stCxn id="5" idx="2"/>
+            <a:endCxn id="7" idx="0"/>
+          </p:cNvCxnSpPr>
+          <p:nvPr/>
+        </p:nvCxnSpPr>
+        <p:spPr>
+          <a:xfrm>
+            <a:off x="7943851" y="771524"/>
+            <a:ext cx="849109" cy="428625"/>
+          </a:xfrm>
+          <a:prstGeom prst="line">
+            <a:avLst/>
+          </a:prstGeom>
+          <a:ln w="19050"/>
+        </p:spPr>
+        <p:style>
+          <a:lnRef idx="1">
+            <a:schemeClr val="accent1"/>
+          </a:lnRef>
+          <a:fillRef idx="0">
+            <a:schemeClr val="accent1"/>
+          </a:fillRef>
+          <a:effectRef idx="0">
+            <a:schemeClr val="accent1"/>
+          </a:effectRef>
+          <a:fontRef idx="minor">
+            <a:schemeClr val="tx1"/>
+          </a:fontRef>
+        </p:style>
+      </p:cxnSp>
+      <p:sp>
+        <p:nvSpPr>
+          <p:cNvPr id="16" name="Прямоугольник 15"/>
+          <p:cNvSpPr/>
+          <p:nvPr/>
+        </p:nvSpPr>
+        <p:spPr>
+          <a:xfrm>
+            <a:off x="6248401" y="1933574"/>
+            <a:ext cx="742950" cy="438150"/>
+          </a:xfrm>
+          <a:prstGeom prst="rect">
+            <a:avLst/>
+          </a:prstGeom>
+          <a:noFill/>
+          <a:ln w="19050"/>
+        </p:spPr>
+        <p:style>
+          <a:lnRef idx="2">
+            <a:schemeClr val="accent1">
+              <a:shade val="50000"/>
+            </a:schemeClr>
+          </a:lnRef>
+          <a:fillRef idx="1">
+            <a:schemeClr val="accent1"/>
+          </a:fillRef>
+          <a:effectRef idx="0">
+            <a:schemeClr val="accent1"/>
+          </a:effectRef>
+          <a:fontRef idx="minor">
+            <a:schemeClr val="lt1"/>
+          </a:fontRef>
+        </p:style>
+        <p:txBody>
+          <a:bodyPr rtlCol="0" anchor="ctr"/>
+          <a:lstStyle/>
+          <a:p>
+            <a:pPr algn="ctr"/>
+            <a:r>
+              <a:rPr lang="en-US" dirty="0" smtClean="0">
+                <a:solidFill>
+                  <a:schemeClr val="tx1"/>
+                </a:solidFill>
+              </a:rPr>
+              <a:t>User</a:t>
+            </a:r>
+            <a:endParaRPr lang="ru-RU" dirty="0">
+              <a:solidFill>
+                <a:schemeClr val="tx1"/>
+              </a:solidFill>
+            </a:endParaRPr>
+          </a:p>
+        </p:txBody>
+      </p:sp>
+      <p:cxnSp>
+        <p:nvCxnSpPr>
+          <p:cNvPr id="17" name="Прямая соединительная линия 16"/>
+          <p:cNvCxnSpPr>
+            <a:stCxn id="6" idx="2"/>
+            <a:endCxn id="16" idx="0"/>
+          </p:cNvCxnSpPr>
+          <p:nvPr/>
+        </p:nvCxnSpPr>
+        <p:spPr>
+          <a:xfrm flipH="1">
+            <a:off x="6619876" y="1638299"/>
+            <a:ext cx="371475" cy="295275"/>
+          </a:xfrm>
+          <a:prstGeom prst="line">
+            <a:avLst/>
+          </a:prstGeom>
+          <a:ln w="19050"/>
+        </p:spPr>
+        <p:style>
+          <a:lnRef idx="1">
+            <a:schemeClr val="accent1"/>
+          </a:lnRef>
+          <a:fillRef idx="0">
+            <a:schemeClr val="accent1"/>
+          </a:fillRef>
+          <a:effectRef idx="0">
+            <a:schemeClr val="accent1"/>
+          </a:effectRef>
+          <a:fontRef idx="minor">
+            <a:schemeClr val="tx1"/>
+          </a:fontRef>
+        </p:style>
+      </p:cxnSp>
+      <p:sp>
+        <p:nvSpPr>
+          <p:cNvPr id="21" name="Прямоугольник 20"/>
+          <p:cNvSpPr/>
+          <p:nvPr/>
+        </p:nvSpPr>
+        <p:spPr>
+          <a:xfrm>
+            <a:off x="7777773" y="1933574"/>
+            <a:ext cx="849109" cy="438150"/>
+          </a:xfrm>
+          <a:prstGeom prst="rect">
+            <a:avLst/>
+          </a:prstGeom>
+          <a:noFill/>
+          <a:ln w="19050"/>
+        </p:spPr>
+        <p:style>
+          <a:lnRef idx="2">
+            <a:schemeClr val="accent1">
+              <a:shade val="50000"/>
+            </a:schemeClr>
+          </a:lnRef>
+          <a:fillRef idx="1">
+            <a:schemeClr val="accent1"/>
+          </a:fillRef>
+          <a:effectRef idx="0">
+            <a:schemeClr val="accent1"/>
+          </a:effectRef>
+          <a:fontRef idx="minor">
+            <a:schemeClr val="lt1"/>
+          </a:fontRef>
+        </p:style>
+        <p:txBody>
+          <a:bodyPr rtlCol="0" anchor="ctr"/>
+          <a:lstStyle/>
+          <a:p>
+            <a:pPr algn="ctr"/>
+            <a:r>
+              <a:rPr lang="en-US" dirty="0" smtClean="0">
+                <a:solidFill>
+                  <a:schemeClr val="tx1"/>
+                </a:solidFill>
+              </a:rPr>
+              <a:t>User</a:t>
+            </a:r>
+            <a:endParaRPr lang="ru-RU" dirty="0">
+              <a:solidFill>
+                <a:schemeClr val="tx1"/>
+              </a:solidFill>
+            </a:endParaRPr>
+          </a:p>
+        </p:txBody>
+      </p:sp>
+      <p:cxnSp>
+        <p:nvCxnSpPr>
+          <p:cNvPr id="22" name="Прямая соединительная линия 21"/>
+          <p:cNvCxnSpPr>
+            <a:stCxn id="21" idx="0"/>
+            <a:endCxn id="7" idx="2"/>
+          </p:cNvCxnSpPr>
+          <p:nvPr/>
+        </p:nvCxnSpPr>
+        <p:spPr>
+          <a:xfrm flipV="1">
+            <a:off x="8202328" y="1638299"/>
+            <a:ext cx="590632" cy="295275"/>
+          </a:xfrm>
+          <a:prstGeom prst="line">
+            <a:avLst/>
+          </a:prstGeom>
+          <a:ln w="19050"/>
+        </p:spPr>
+        <p:style>
+          <a:lnRef idx="1">
+            <a:schemeClr val="accent1"/>
+          </a:lnRef>
+          <a:fillRef idx="0">
+            <a:schemeClr val="accent1"/>
+          </a:fillRef>
+          <a:effectRef idx="0">
+            <a:schemeClr val="accent1"/>
+          </a:effectRef>
+          <a:fontRef idx="minor">
+            <a:schemeClr val="tx1"/>
+          </a:fontRef>
+        </p:style>
+      </p:cxnSp>
+      <p:sp>
+        <p:nvSpPr>
+          <p:cNvPr id="27" name="Прямоугольник 26"/>
+          <p:cNvSpPr/>
+          <p:nvPr/>
+        </p:nvSpPr>
+        <p:spPr>
+          <a:xfrm>
+            <a:off x="9051437" y="1933574"/>
+            <a:ext cx="1004277" cy="438150"/>
+          </a:xfrm>
+          <a:prstGeom prst="rect">
+            <a:avLst/>
+          </a:prstGeom>
+          <a:noFill/>
+          <a:ln w="19050"/>
+        </p:spPr>
+        <p:style>
+          <a:lnRef idx="2">
+            <a:schemeClr val="accent1">
+              <a:shade val="50000"/>
+            </a:schemeClr>
+          </a:lnRef>
+          <a:fillRef idx="1">
+            <a:schemeClr val="accent1"/>
+          </a:fillRef>
+          <a:effectRef idx="0">
+            <a:schemeClr val="accent1"/>
+          </a:effectRef>
+          <a:fontRef idx="minor">
+            <a:schemeClr val="lt1"/>
+          </a:fontRef>
+        </p:style>
+        <p:txBody>
+          <a:bodyPr rtlCol="0" anchor="ctr"/>
+          <a:lstStyle/>
+          <a:p>
+            <a:pPr algn="ctr"/>
+            <a:r>
+              <a:rPr lang="en-US" dirty="0" smtClean="0">
+                <a:solidFill>
+                  <a:schemeClr val="tx1"/>
+                </a:solidFill>
+              </a:rPr>
+              <a:t>Support</a:t>
+            </a:r>
+            <a:endParaRPr lang="ru-RU" dirty="0">
+              <a:solidFill>
+                <a:schemeClr val="tx1"/>
+              </a:solidFill>
+            </a:endParaRPr>
+          </a:p>
+        </p:txBody>
+      </p:sp>
+      <p:cxnSp>
+        <p:nvCxnSpPr>
+          <p:cNvPr id="28" name="Прямая соединительная линия 27"/>
+          <p:cNvCxnSpPr>
+            <a:stCxn id="7" idx="2"/>
+            <a:endCxn id="27" idx="0"/>
+          </p:cNvCxnSpPr>
+          <p:nvPr/>
+        </p:nvCxnSpPr>
+        <p:spPr>
+          <a:xfrm>
+            <a:off x="8792960" y="1638299"/>
+            <a:ext cx="760616" cy="295275"/>
+          </a:xfrm>
+          <a:prstGeom prst="line">
+            <a:avLst/>
+          </a:prstGeom>
+          <a:ln w="19050"/>
+        </p:spPr>
+        <p:style>
+          <a:lnRef idx="1">
+            <a:schemeClr val="accent1"/>
+          </a:lnRef>
+          <a:fillRef idx="0">
+            <a:schemeClr val="accent1"/>
+          </a:fillRef>
+          <a:effectRef idx="0">
+            <a:schemeClr val="accent1"/>
+          </a:effectRef>
+          <a:fontRef idx="minor">
+            <a:schemeClr val="tx1"/>
+          </a:fontRef>
+        </p:style>
+      </p:cxnSp>
+    </p:spTree>
+    <p:extLst>
+      <p:ext uri="{BB962C8B-B14F-4D97-AF65-F5344CB8AC3E}">
+        <p14:creationId xmlns:p14="http://schemas.microsoft.com/office/powerpoint/2010/main" val="1840950370"/>
+      </p:ext>
+    </p:extLst>
+  </p:cSld>
+  <p:clrMapOvr>
+    <a:masterClrMapping/>
+  </p:clrMapOvr>
+</p:sld>
+</file>
+
+<file path=ppt/slides/slide3.xml><?xml version="1.0" encoding="utf-8"?>
+<p:sld xmlns:a="http://schemas.openxmlformats.org/drawingml/2006/main" xmlns:r="http://schemas.openxmlformats.org/officeDocument/2006/relationships" xmlns:p="http://schemas.openxmlformats.org/presentationml/2006/main">
+  <p:cSld>
+    <p:spTree>
+      <p:nvGrpSpPr>
+        <p:cNvPr id="1" name=""/>
+        <p:cNvGrpSpPr/>
+        <p:nvPr/>
+      </p:nvGrpSpPr>
+      <p:grpSpPr>
+        <a:xfrm>
+          <a:off x="0" y="0"/>
+          <a:ext cx="0" cy="0"/>
+          <a:chOff x="0" y="0"/>
+          <a:chExt cx="0" cy="0"/>
+        </a:xfrm>
+      </p:grpSpPr>
+      <p:pic>
+        <p:nvPicPr>
           <p:cNvPr id="7" name="Рисунок 6"/>
           <p:cNvPicPr>
             <a:picLocks noChangeAspect="1"/>
@@ -4010,7 +4570,7 @@
 </p:sld>
 </file>
 
-<file path=ppt/slides/slide3.xml><?xml version="1.0" encoding="utf-8"?>
+<file path=ppt/slides/slide4.xml><?xml version="1.0" encoding="utf-8"?>
 <p:sld xmlns:a="http://schemas.openxmlformats.org/drawingml/2006/main" xmlns:r="http://schemas.openxmlformats.org/officeDocument/2006/relationships" xmlns:p="http://schemas.openxmlformats.org/presentationml/2006/main">
   <p:cSld>
     <p:spTree>

</xml_diff>

<commit_message>
'master: init commit Сб янв 16 18:53:50 MSK 2021'
</commit_message>
<xml_diff>
--- a/My/OLD/Презентация Microsoft PowerPoint.pptx
+++ b/My/OLD/Презентация Microsoft PowerPoint.pptx
@@ -246,7 +246,7 @@
           <a:p>
             <a:fld id="{AC82883B-63A8-447F-80BA-2BA680915AAD}" type="datetimeFigureOut">
               <a:rPr lang="ru-RU" smtClean="0"/>
-              <a:t>15.01.2021</a:t>
+              <a:t>16.01.2021</a:t>
             </a:fld>
             <a:endParaRPr lang="ru-RU"/>
           </a:p>
@@ -416,7 +416,7 @@
           <a:p>
             <a:fld id="{AC82883B-63A8-447F-80BA-2BA680915AAD}" type="datetimeFigureOut">
               <a:rPr lang="ru-RU" smtClean="0"/>
-              <a:t>15.01.2021</a:t>
+              <a:t>16.01.2021</a:t>
             </a:fld>
             <a:endParaRPr lang="ru-RU"/>
           </a:p>
@@ -596,7 +596,7 @@
           <a:p>
             <a:fld id="{AC82883B-63A8-447F-80BA-2BA680915AAD}" type="datetimeFigureOut">
               <a:rPr lang="ru-RU" smtClean="0"/>
-              <a:t>15.01.2021</a:t>
+              <a:t>16.01.2021</a:t>
             </a:fld>
             <a:endParaRPr lang="ru-RU"/>
           </a:p>
@@ -766,7 +766,7 @@
           <a:p>
             <a:fld id="{AC82883B-63A8-447F-80BA-2BA680915AAD}" type="datetimeFigureOut">
               <a:rPr lang="ru-RU" smtClean="0"/>
-              <a:t>15.01.2021</a:t>
+              <a:t>16.01.2021</a:t>
             </a:fld>
             <a:endParaRPr lang="ru-RU"/>
           </a:p>
@@ -1012,7 +1012,7 @@
           <a:p>
             <a:fld id="{AC82883B-63A8-447F-80BA-2BA680915AAD}" type="datetimeFigureOut">
               <a:rPr lang="ru-RU" smtClean="0"/>
-              <a:t>15.01.2021</a:t>
+              <a:t>16.01.2021</a:t>
             </a:fld>
             <a:endParaRPr lang="ru-RU"/>
           </a:p>
@@ -1244,7 +1244,7 @@
           <a:p>
             <a:fld id="{AC82883B-63A8-447F-80BA-2BA680915AAD}" type="datetimeFigureOut">
               <a:rPr lang="ru-RU" smtClean="0"/>
-              <a:t>15.01.2021</a:t>
+              <a:t>16.01.2021</a:t>
             </a:fld>
             <a:endParaRPr lang="ru-RU"/>
           </a:p>
@@ -1611,7 +1611,7 @@
           <a:p>
             <a:fld id="{AC82883B-63A8-447F-80BA-2BA680915AAD}" type="datetimeFigureOut">
               <a:rPr lang="ru-RU" smtClean="0"/>
-              <a:t>15.01.2021</a:t>
+              <a:t>16.01.2021</a:t>
             </a:fld>
             <a:endParaRPr lang="ru-RU"/>
           </a:p>
@@ -1729,7 +1729,7 @@
           <a:p>
             <a:fld id="{AC82883B-63A8-447F-80BA-2BA680915AAD}" type="datetimeFigureOut">
               <a:rPr lang="ru-RU" smtClean="0"/>
-              <a:t>15.01.2021</a:t>
+              <a:t>16.01.2021</a:t>
             </a:fld>
             <a:endParaRPr lang="ru-RU"/>
           </a:p>
@@ -1824,7 +1824,7 @@
           <a:p>
             <a:fld id="{AC82883B-63A8-447F-80BA-2BA680915AAD}" type="datetimeFigureOut">
               <a:rPr lang="ru-RU" smtClean="0"/>
-              <a:t>15.01.2021</a:t>
+              <a:t>16.01.2021</a:t>
             </a:fld>
             <a:endParaRPr lang="ru-RU"/>
           </a:p>
@@ -2101,7 +2101,7 @@
           <a:p>
             <a:fld id="{AC82883B-63A8-447F-80BA-2BA680915AAD}" type="datetimeFigureOut">
               <a:rPr lang="ru-RU" smtClean="0"/>
-              <a:t>15.01.2021</a:t>
+              <a:t>16.01.2021</a:t>
             </a:fld>
             <a:endParaRPr lang="ru-RU"/>
           </a:p>
@@ -2354,7 +2354,7 @@
           <a:p>
             <a:fld id="{AC82883B-63A8-447F-80BA-2BA680915AAD}" type="datetimeFigureOut">
               <a:rPr lang="ru-RU" smtClean="0"/>
-              <a:t>15.01.2021</a:t>
+              <a:t>16.01.2021</a:t>
             </a:fld>
             <a:endParaRPr lang="ru-RU"/>
           </a:p>
@@ -2567,7 +2567,7 @@
           <a:p>
             <a:fld id="{AC82883B-63A8-447F-80BA-2BA680915AAD}" type="datetimeFigureOut">
               <a:rPr lang="ru-RU" smtClean="0"/>
-              <a:t>15.01.2021</a:t>
+              <a:t>16.01.2021</a:t>
             </a:fld>
             <a:endParaRPr lang="ru-RU"/>
           </a:p>
@@ -3635,6 +3635,36 @@
           </a:fontRef>
         </p:style>
       </p:cxnSp>
+      <p:pic>
+        <p:nvPicPr>
+          <p:cNvPr id="2" name="Рисунок 1"/>
+          <p:cNvPicPr>
+            <a:picLocks noChangeAspect="1"/>
+          </p:cNvPicPr>
+          <p:nvPr/>
+        </p:nvPicPr>
+        <p:blipFill>
+          <a:blip r:embed="rId3">
+            <a:extLst>
+              <a:ext uri="{28A0092B-C50C-407E-A947-70E740481C1C}">
+                <a14:useLocalDpi xmlns:a14="http://schemas.microsoft.com/office/drawing/2010/main" val="0"/>
+              </a:ext>
+            </a:extLst>
+          </a:blip>
+          <a:stretch>
+            <a:fillRect/>
+          </a:stretch>
+        </p:blipFill>
+        <p:spPr>
+          <a:xfrm>
+            <a:off x="1122365" y="327876"/>
+            <a:ext cx="10058400" cy="2182695"/>
+          </a:xfrm>
+          <a:prstGeom prst="rect">
+            <a:avLst/>
+          </a:prstGeom>
+        </p:spPr>
+      </p:pic>
     </p:spTree>
     <p:extLst>
       <p:ext uri="{BB962C8B-B14F-4D97-AF65-F5344CB8AC3E}">

</xml_diff>